<commit_message>
Added term clustering graphic to powerpoint
</commit_message>
<xml_diff>
--- a/docs/presentation.pptx
+++ b/docs/presentation.pptx
@@ -21,9 +21,10 @@
     <p:sldId id="271" r:id="rId15"/>
     <p:sldId id="272" r:id="rId16"/>
     <p:sldId id="273" r:id="rId17"/>
-    <p:sldId id="274" r:id="rId18"/>
-    <p:sldId id="260" r:id="rId19"/>
-    <p:sldId id="267" r:id="rId20"/>
+    <p:sldId id="275" r:id="rId18"/>
+    <p:sldId id="274" r:id="rId19"/>
+    <p:sldId id="260" r:id="rId20"/>
+    <p:sldId id="267" r:id="rId21"/>
   </p:sldIdLst>
   <p:sldSz cx="12192000" cy="6858000"/>
   <p:notesSz cx="6858000" cy="9144000"/>
@@ -3344,16 +3345,16 @@
     </dgm:pt>
   </dgm:ptLst>
   <dgm:cxnLst>
-    <dgm:cxn modelId="{85EABAA7-D7A4-4AB7-B22B-9712989B93F0}" type="presOf" srcId="{5A531D99-B84E-4AF3-A437-B8448FE4E2B9}" destId="{201AA08F-03A7-47E4-BE01-E48D1FAB16DA}" srcOrd="0" destOrd="0" presId="urn:microsoft.com/office/officeart/2005/8/layout/process1"/>
-    <dgm:cxn modelId="{830DC654-9D76-46FE-ADBD-1E904728BC16}" srcId="{3096E159-40D3-414A-80F6-250B4D8BFD47}" destId="{E5702974-0ED9-4643-BAC1-110A83A02B58}" srcOrd="0" destOrd="0" parTransId="{04E0E73D-15E7-4C78-AB3E-25665872F886}" sibTransId="{4BFEE441-A433-4286-B540-F49EC5C239F8}"/>
-    <dgm:cxn modelId="{B534C948-4EFB-4B3B-BAEF-AC208D422F16}" type="presOf" srcId="{E5702974-0ED9-4643-BAC1-110A83A02B58}" destId="{57822964-2392-40EC-85E4-20F152301F81}" srcOrd="0" destOrd="0" presId="urn:microsoft.com/office/officeart/2005/8/layout/process1"/>
-    <dgm:cxn modelId="{E38ED4C2-44CD-4FDC-AD26-44BCE46A6958}" type="presOf" srcId="{32A4DBDD-6A40-41A5-8BFC-87F0A156C9F7}" destId="{01E74070-BC89-4E6C-B7B6-2C389AC66633}" srcOrd="0" destOrd="0" presId="urn:microsoft.com/office/officeart/2005/8/layout/process1"/>
-    <dgm:cxn modelId="{60E91877-EF16-4413-B98B-B86A9F10EA30}" type="presOf" srcId="{0DFE6958-23C7-4DC3-B3CA-4064FEE42DFC}" destId="{B640E2EA-7CD7-4A75-9991-ABAA1449AC7D}" srcOrd="0" destOrd="0" presId="urn:microsoft.com/office/officeart/2005/8/layout/process1"/>
-    <dgm:cxn modelId="{AE8624F8-4BE8-4032-B704-C9521473D0D5}" srcId="{3096E159-40D3-414A-80F6-250B4D8BFD47}" destId="{5A531D99-B84E-4AF3-A437-B8448FE4E2B9}" srcOrd="2" destOrd="0" parTransId="{1D605A95-D13E-488D-ADB8-CE5AFC00AF23}" sibTransId="{8933FFE8-EDB2-4C29-B310-A01A92F37602}"/>
-    <dgm:cxn modelId="{ED8C808E-F974-44FB-8450-39F467C7B685}" type="presOf" srcId="{4BFEE441-A433-4286-B540-F49EC5C239F8}" destId="{6C1FC4BC-1E72-496C-A0C3-422352D72408}" srcOrd="0" destOrd="0" presId="urn:microsoft.com/office/officeart/2005/8/layout/process1"/>
     <dgm:cxn modelId="{05F15B23-488E-4657-95E0-C5A2DDB81C8E}" type="presOf" srcId="{3096E159-40D3-414A-80F6-250B4D8BFD47}" destId="{2B3ED628-E4B6-4798-BE01-D41BCE33D47D}" srcOrd="0" destOrd="0" presId="urn:microsoft.com/office/officeart/2005/8/layout/process1"/>
     <dgm:cxn modelId="{A50BDEDF-E043-42B0-9EAD-297975E613AD}" type="presOf" srcId="{4BFEE441-A433-4286-B540-F49EC5C239F8}" destId="{22BE713E-402A-4492-8E6F-23C36AA26DE6}" srcOrd="1" destOrd="0" presId="urn:microsoft.com/office/officeart/2005/8/layout/process1"/>
+    <dgm:cxn modelId="{AE8624F8-4BE8-4032-B704-C9521473D0D5}" srcId="{3096E159-40D3-414A-80F6-250B4D8BFD47}" destId="{5A531D99-B84E-4AF3-A437-B8448FE4E2B9}" srcOrd="2" destOrd="0" parTransId="{1D605A95-D13E-488D-ADB8-CE5AFC00AF23}" sibTransId="{8933FFE8-EDB2-4C29-B310-A01A92F37602}"/>
     <dgm:cxn modelId="{C663987D-0204-4D51-BCB5-6781FFC544DE}" type="presOf" srcId="{0DFE6958-23C7-4DC3-B3CA-4064FEE42DFC}" destId="{7D1F9921-E645-45D0-9105-0FAFB0428E2D}" srcOrd="1" destOrd="0" presId="urn:microsoft.com/office/officeart/2005/8/layout/process1"/>
+    <dgm:cxn modelId="{85EABAA7-D7A4-4AB7-B22B-9712989B93F0}" type="presOf" srcId="{5A531D99-B84E-4AF3-A437-B8448FE4E2B9}" destId="{201AA08F-03A7-47E4-BE01-E48D1FAB16DA}" srcOrd="0" destOrd="0" presId="urn:microsoft.com/office/officeart/2005/8/layout/process1"/>
+    <dgm:cxn modelId="{ED8C808E-F974-44FB-8450-39F467C7B685}" type="presOf" srcId="{4BFEE441-A433-4286-B540-F49EC5C239F8}" destId="{6C1FC4BC-1E72-496C-A0C3-422352D72408}" srcOrd="0" destOrd="0" presId="urn:microsoft.com/office/officeart/2005/8/layout/process1"/>
+    <dgm:cxn modelId="{60E91877-EF16-4413-B98B-B86A9F10EA30}" type="presOf" srcId="{0DFE6958-23C7-4DC3-B3CA-4064FEE42DFC}" destId="{B640E2EA-7CD7-4A75-9991-ABAA1449AC7D}" srcOrd="0" destOrd="0" presId="urn:microsoft.com/office/officeart/2005/8/layout/process1"/>
+    <dgm:cxn modelId="{B534C948-4EFB-4B3B-BAEF-AC208D422F16}" type="presOf" srcId="{E5702974-0ED9-4643-BAC1-110A83A02B58}" destId="{57822964-2392-40EC-85E4-20F152301F81}" srcOrd="0" destOrd="0" presId="urn:microsoft.com/office/officeart/2005/8/layout/process1"/>
+    <dgm:cxn modelId="{830DC654-9D76-46FE-ADBD-1E904728BC16}" srcId="{3096E159-40D3-414A-80F6-250B4D8BFD47}" destId="{E5702974-0ED9-4643-BAC1-110A83A02B58}" srcOrd="0" destOrd="0" parTransId="{04E0E73D-15E7-4C78-AB3E-25665872F886}" sibTransId="{4BFEE441-A433-4286-B540-F49EC5C239F8}"/>
+    <dgm:cxn modelId="{E38ED4C2-44CD-4FDC-AD26-44BCE46A6958}" type="presOf" srcId="{32A4DBDD-6A40-41A5-8BFC-87F0A156C9F7}" destId="{01E74070-BC89-4E6C-B7B6-2C389AC66633}" srcOrd="0" destOrd="0" presId="urn:microsoft.com/office/officeart/2005/8/layout/process1"/>
     <dgm:cxn modelId="{3F0A8112-CB4C-4220-A76A-591AD6CC239B}" srcId="{3096E159-40D3-414A-80F6-250B4D8BFD47}" destId="{32A4DBDD-6A40-41A5-8BFC-87F0A156C9F7}" srcOrd="1" destOrd="0" parTransId="{1FC39C56-D9E5-4754-B776-89D996BBB99E}" sibTransId="{0DFE6958-23C7-4DC3-B3CA-4064FEE42DFC}"/>
     <dgm:cxn modelId="{6EEFC292-3BE3-4245-A4FB-E2F6E9B3CDC3}" type="presParOf" srcId="{2B3ED628-E4B6-4798-BE01-D41BCE33D47D}" destId="{57822964-2392-40EC-85E4-20F152301F81}" srcOrd="0" destOrd="0" presId="urn:microsoft.com/office/officeart/2005/8/layout/process1"/>
     <dgm:cxn modelId="{FA1863FB-7880-4EA5-87DD-976E569D67C0}" type="presParOf" srcId="{2B3ED628-E4B6-4798-BE01-D41BCE33D47D}" destId="{6C1FC4BC-1E72-496C-A0C3-422352D72408}" srcOrd="1" destOrd="0" presId="urn:microsoft.com/office/officeart/2005/8/layout/process1"/>
@@ -3381,544 +3382,6 @@
       <dsp:cNvGrpSpPr/>
     </dsp:nvGrpSpPr>
     <dsp:grpSpPr/>
-    <dsp:sp modelId="{2CCB3FBF-61E2-4489-9A2F-FAB5D6A8765A}">
-      <dsp:nvSpPr>
-        <dsp:cNvPr id="0" name=""/>
-        <dsp:cNvSpPr/>
-      </dsp:nvSpPr>
-      <dsp:spPr>
-        <a:xfrm>
-          <a:off x="4621" y="1569532"/>
-          <a:ext cx="2020453" cy="1212272"/>
-        </a:xfrm>
-        <a:prstGeom prst="roundRect">
-          <a:avLst>
-            <a:gd name="adj" fmla="val 10000"/>
-          </a:avLst>
-        </a:prstGeom>
-        <a:solidFill>
-          <a:schemeClr val="accent1">
-            <a:hueOff val="0"/>
-            <a:satOff val="0"/>
-            <a:lumOff val="0"/>
-            <a:alphaOff val="0"/>
-          </a:schemeClr>
-        </a:solidFill>
-        <a:ln w="12700" cap="flat" cmpd="sng" algn="ctr">
-          <a:solidFill>
-            <a:schemeClr val="lt1">
-              <a:hueOff val="0"/>
-              <a:satOff val="0"/>
-              <a:lumOff val="0"/>
-              <a:alphaOff val="0"/>
-            </a:schemeClr>
-          </a:solidFill>
-          <a:prstDash val="solid"/>
-          <a:miter lim="800000"/>
-        </a:ln>
-        <a:effectLst/>
-      </dsp:spPr>
-      <dsp:style>
-        <a:lnRef idx="2">
-          <a:scrgbClr r="0" g="0" b="0"/>
-        </a:lnRef>
-        <a:fillRef idx="1">
-          <a:scrgbClr r="0" g="0" b="0"/>
-        </a:fillRef>
-        <a:effectRef idx="0">
-          <a:scrgbClr r="0" g="0" b="0"/>
-        </a:effectRef>
-        <a:fontRef idx="minor">
-          <a:schemeClr val="lt1"/>
-        </a:fontRef>
-      </dsp:style>
-      <dsp:txBody>
-        <a:bodyPr spcFirstLastPara="0" vert="horz" wrap="square" lIns="64770" tIns="64770" rIns="64770" bIns="64770" numCol="1" spcCol="1270" anchor="ctr" anchorCtr="0">
-          <a:noAutofit/>
-        </a:bodyPr>
-        <a:lstStyle/>
-        <a:p>
-          <a:pPr lvl="0" algn="ctr" defTabSz="755650">
-            <a:lnSpc>
-              <a:spcPct val="90000"/>
-            </a:lnSpc>
-            <a:spcBef>
-              <a:spcPct val="0"/>
-            </a:spcBef>
-            <a:spcAft>
-              <a:spcPct val="35000"/>
-            </a:spcAft>
-          </a:pPr>
-          <a:r>
-            <a:rPr lang="en-US" sz="1700" kern="1200" dirty="0" smtClean="0"/>
-            <a:t>articles.csv </a:t>
-          </a:r>
-          <a:endParaRPr lang="en-US" sz="1700" kern="1200" dirty="0"/>
-        </a:p>
-      </dsp:txBody>
-      <dsp:txXfrm>
-        <a:off x="40127" y="1605038"/>
-        <a:ext cx="1949441" cy="1141260"/>
-      </dsp:txXfrm>
-    </dsp:sp>
-    <dsp:sp modelId="{C6BBAB1C-8441-4ED1-9F7B-1AE83F583C7D}">
-      <dsp:nvSpPr>
-        <dsp:cNvPr id="0" name=""/>
-        <dsp:cNvSpPr/>
-      </dsp:nvSpPr>
-      <dsp:spPr>
-        <a:xfrm>
-          <a:off x="2227119" y="1925132"/>
-          <a:ext cx="428336" cy="501072"/>
-        </a:xfrm>
-        <a:prstGeom prst="rightArrow">
-          <a:avLst>
-            <a:gd name="adj1" fmla="val 60000"/>
-            <a:gd name="adj2" fmla="val 50000"/>
-          </a:avLst>
-        </a:prstGeom>
-        <a:solidFill>
-          <a:schemeClr val="accent1">
-            <a:tint val="60000"/>
-            <a:hueOff val="0"/>
-            <a:satOff val="0"/>
-            <a:lumOff val="0"/>
-            <a:alphaOff val="0"/>
-          </a:schemeClr>
-        </a:solidFill>
-        <a:ln>
-          <a:noFill/>
-        </a:ln>
-        <a:effectLst/>
-      </dsp:spPr>
-      <dsp:style>
-        <a:lnRef idx="0">
-          <a:scrgbClr r="0" g="0" b="0"/>
-        </a:lnRef>
-        <a:fillRef idx="1">
-          <a:scrgbClr r="0" g="0" b="0"/>
-        </a:fillRef>
-        <a:effectRef idx="0">
-          <a:scrgbClr r="0" g="0" b="0"/>
-        </a:effectRef>
-        <a:fontRef idx="minor">
-          <a:schemeClr val="lt1"/>
-        </a:fontRef>
-      </dsp:style>
-      <dsp:txBody>
-        <a:bodyPr spcFirstLastPara="0" vert="horz" wrap="square" lIns="0" tIns="0" rIns="0" bIns="0" numCol="1" spcCol="1270" anchor="ctr" anchorCtr="0">
-          <a:noAutofit/>
-        </a:bodyPr>
-        <a:lstStyle/>
-        <a:p>
-          <a:pPr lvl="0" algn="ctr" defTabSz="622300">
-            <a:lnSpc>
-              <a:spcPct val="90000"/>
-            </a:lnSpc>
-            <a:spcBef>
-              <a:spcPct val="0"/>
-            </a:spcBef>
-            <a:spcAft>
-              <a:spcPct val="35000"/>
-            </a:spcAft>
-          </a:pPr>
-          <a:endParaRPr lang="en-US" sz="1400" kern="1200"/>
-        </a:p>
-      </dsp:txBody>
-      <dsp:txXfrm>
-        <a:off x="2227119" y="2025346"/>
-        <a:ext cx="299835" cy="300644"/>
-      </dsp:txXfrm>
-    </dsp:sp>
-    <dsp:sp modelId="{F82ABD8B-F336-419A-8ED9-2F319D067C56}">
-      <dsp:nvSpPr>
-        <dsp:cNvPr id="0" name=""/>
-        <dsp:cNvSpPr/>
-      </dsp:nvSpPr>
-      <dsp:spPr>
-        <a:xfrm>
-          <a:off x="2833255" y="1569532"/>
-          <a:ext cx="2020453" cy="1212272"/>
-        </a:xfrm>
-        <a:prstGeom prst="roundRect">
-          <a:avLst>
-            <a:gd name="adj" fmla="val 10000"/>
-          </a:avLst>
-        </a:prstGeom>
-        <a:solidFill>
-          <a:schemeClr val="accent1">
-            <a:hueOff val="0"/>
-            <a:satOff val="0"/>
-            <a:lumOff val="0"/>
-            <a:alphaOff val="0"/>
-          </a:schemeClr>
-        </a:solidFill>
-        <a:ln w="12700" cap="flat" cmpd="sng" algn="ctr">
-          <a:solidFill>
-            <a:schemeClr val="lt1">
-              <a:hueOff val="0"/>
-              <a:satOff val="0"/>
-              <a:lumOff val="0"/>
-              <a:alphaOff val="0"/>
-            </a:schemeClr>
-          </a:solidFill>
-          <a:prstDash val="solid"/>
-          <a:miter lim="800000"/>
-        </a:ln>
-        <a:effectLst/>
-      </dsp:spPr>
-      <dsp:style>
-        <a:lnRef idx="2">
-          <a:scrgbClr r="0" g="0" b="0"/>
-        </a:lnRef>
-        <a:fillRef idx="1">
-          <a:scrgbClr r="0" g="0" b="0"/>
-        </a:fillRef>
-        <a:effectRef idx="0">
-          <a:scrgbClr r="0" g="0" b="0"/>
-        </a:effectRef>
-        <a:fontRef idx="minor">
-          <a:schemeClr val="lt1"/>
-        </a:fontRef>
-      </dsp:style>
-      <dsp:txBody>
-        <a:bodyPr spcFirstLastPara="0" vert="horz" wrap="square" lIns="64770" tIns="64770" rIns="64770" bIns="64770" numCol="1" spcCol="1270" anchor="ctr" anchorCtr="0">
-          <a:noAutofit/>
-        </a:bodyPr>
-        <a:lstStyle/>
-        <a:p>
-          <a:pPr lvl="0" algn="ctr" defTabSz="755650">
-            <a:lnSpc>
-              <a:spcPct val="90000"/>
-            </a:lnSpc>
-            <a:spcBef>
-              <a:spcPct val="0"/>
-            </a:spcBef>
-            <a:spcAft>
-              <a:spcPct val="35000"/>
-            </a:spcAft>
-          </a:pPr>
-          <a:r>
-            <a:rPr lang="en-US" sz="1700" kern="1200" dirty="0" err="1" smtClean="0"/>
-            <a:t>clean_text</a:t>
-          </a:r>
-          <a:r>
-            <a:rPr lang="en-US" sz="1700" kern="1200" dirty="0" smtClean="0"/>
-            <a:t>() on each abstract</a:t>
-          </a:r>
-          <a:endParaRPr lang="en-US" sz="1700" kern="1200" dirty="0"/>
-        </a:p>
-      </dsp:txBody>
-      <dsp:txXfrm>
-        <a:off x="2868761" y="1605038"/>
-        <a:ext cx="1949441" cy="1141260"/>
-      </dsp:txXfrm>
-    </dsp:sp>
-    <dsp:sp modelId="{D7F30FBA-81D7-4F92-A987-120A33E90E02}">
-      <dsp:nvSpPr>
-        <dsp:cNvPr id="0" name=""/>
-        <dsp:cNvSpPr/>
-      </dsp:nvSpPr>
-      <dsp:spPr>
-        <a:xfrm>
-          <a:off x="5055754" y="1925132"/>
-          <a:ext cx="428336" cy="501072"/>
-        </a:xfrm>
-        <a:prstGeom prst="rightArrow">
-          <a:avLst>
-            <a:gd name="adj1" fmla="val 60000"/>
-            <a:gd name="adj2" fmla="val 50000"/>
-          </a:avLst>
-        </a:prstGeom>
-        <a:solidFill>
-          <a:schemeClr val="accent1">
-            <a:tint val="60000"/>
-            <a:hueOff val="0"/>
-            <a:satOff val="0"/>
-            <a:lumOff val="0"/>
-            <a:alphaOff val="0"/>
-          </a:schemeClr>
-        </a:solidFill>
-        <a:ln>
-          <a:noFill/>
-        </a:ln>
-        <a:effectLst/>
-      </dsp:spPr>
-      <dsp:style>
-        <a:lnRef idx="0">
-          <a:scrgbClr r="0" g="0" b="0"/>
-        </a:lnRef>
-        <a:fillRef idx="1">
-          <a:scrgbClr r="0" g="0" b="0"/>
-        </a:fillRef>
-        <a:effectRef idx="0">
-          <a:scrgbClr r="0" g="0" b="0"/>
-        </a:effectRef>
-        <a:fontRef idx="minor">
-          <a:schemeClr val="lt1"/>
-        </a:fontRef>
-      </dsp:style>
-      <dsp:txBody>
-        <a:bodyPr spcFirstLastPara="0" vert="horz" wrap="square" lIns="0" tIns="0" rIns="0" bIns="0" numCol="1" spcCol="1270" anchor="ctr" anchorCtr="0">
-          <a:noAutofit/>
-        </a:bodyPr>
-        <a:lstStyle/>
-        <a:p>
-          <a:pPr lvl="0" algn="ctr" defTabSz="622300">
-            <a:lnSpc>
-              <a:spcPct val="90000"/>
-            </a:lnSpc>
-            <a:spcBef>
-              <a:spcPct val="0"/>
-            </a:spcBef>
-            <a:spcAft>
-              <a:spcPct val="35000"/>
-            </a:spcAft>
-          </a:pPr>
-          <a:endParaRPr lang="en-US" sz="1400" kern="1200"/>
-        </a:p>
-      </dsp:txBody>
-      <dsp:txXfrm>
-        <a:off x="5055754" y="2025346"/>
-        <a:ext cx="299835" cy="300644"/>
-      </dsp:txXfrm>
-    </dsp:sp>
-    <dsp:sp modelId="{FB687F3F-0590-4628-A043-32446B5DD71C}">
-      <dsp:nvSpPr>
-        <dsp:cNvPr id="0" name=""/>
-        <dsp:cNvSpPr/>
-      </dsp:nvSpPr>
-      <dsp:spPr>
-        <a:xfrm>
-          <a:off x="5661890" y="1569532"/>
-          <a:ext cx="2020453" cy="1212272"/>
-        </a:xfrm>
-        <a:prstGeom prst="roundRect">
-          <a:avLst>
-            <a:gd name="adj" fmla="val 10000"/>
-          </a:avLst>
-        </a:prstGeom>
-        <a:solidFill>
-          <a:schemeClr val="accent1">
-            <a:hueOff val="0"/>
-            <a:satOff val="0"/>
-            <a:lumOff val="0"/>
-            <a:alphaOff val="0"/>
-          </a:schemeClr>
-        </a:solidFill>
-        <a:ln w="12700" cap="flat" cmpd="sng" algn="ctr">
-          <a:solidFill>
-            <a:schemeClr val="lt1">
-              <a:hueOff val="0"/>
-              <a:satOff val="0"/>
-              <a:lumOff val="0"/>
-              <a:alphaOff val="0"/>
-            </a:schemeClr>
-          </a:solidFill>
-          <a:prstDash val="solid"/>
-          <a:miter lim="800000"/>
-        </a:ln>
-        <a:effectLst/>
-      </dsp:spPr>
-      <dsp:style>
-        <a:lnRef idx="2">
-          <a:scrgbClr r="0" g="0" b="0"/>
-        </a:lnRef>
-        <a:fillRef idx="1">
-          <a:scrgbClr r="0" g="0" b="0"/>
-        </a:fillRef>
-        <a:effectRef idx="0">
-          <a:scrgbClr r="0" g="0" b="0"/>
-        </a:effectRef>
-        <a:fontRef idx="minor">
-          <a:schemeClr val="lt1"/>
-        </a:fontRef>
-      </dsp:style>
-      <dsp:txBody>
-        <a:bodyPr spcFirstLastPara="0" vert="horz" wrap="square" lIns="64770" tIns="64770" rIns="64770" bIns="64770" numCol="1" spcCol="1270" anchor="ctr" anchorCtr="0">
-          <a:noAutofit/>
-        </a:bodyPr>
-        <a:lstStyle/>
-        <a:p>
-          <a:pPr lvl="0" algn="ctr" defTabSz="755650">
-            <a:lnSpc>
-              <a:spcPct val="90000"/>
-            </a:lnSpc>
-            <a:spcBef>
-              <a:spcPct val="0"/>
-            </a:spcBef>
-            <a:spcAft>
-              <a:spcPct val="35000"/>
-            </a:spcAft>
-          </a:pPr>
-          <a:r>
-            <a:rPr lang="en-US" sz="1700" kern="1200" dirty="0" smtClean="0"/>
-            <a:t>Word counting</a:t>
-          </a:r>
-          <a:endParaRPr lang="en-US" sz="1700" kern="1200" dirty="0"/>
-        </a:p>
-      </dsp:txBody>
-      <dsp:txXfrm>
-        <a:off x="5697396" y="1605038"/>
-        <a:ext cx="1949441" cy="1141260"/>
-      </dsp:txXfrm>
-    </dsp:sp>
-    <dsp:sp modelId="{2A00525E-DAFE-46B4-8A28-FB4F2E89ADA8}">
-      <dsp:nvSpPr>
-        <dsp:cNvPr id="0" name=""/>
-        <dsp:cNvSpPr/>
-      </dsp:nvSpPr>
-      <dsp:spPr>
-        <a:xfrm>
-          <a:off x="7884389" y="1925132"/>
-          <a:ext cx="428336" cy="501072"/>
-        </a:xfrm>
-        <a:prstGeom prst="rightArrow">
-          <a:avLst>
-            <a:gd name="adj1" fmla="val 60000"/>
-            <a:gd name="adj2" fmla="val 50000"/>
-          </a:avLst>
-        </a:prstGeom>
-        <a:solidFill>
-          <a:schemeClr val="accent1">
-            <a:tint val="60000"/>
-            <a:hueOff val="0"/>
-            <a:satOff val="0"/>
-            <a:lumOff val="0"/>
-            <a:alphaOff val="0"/>
-          </a:schemeClr>
-        </a:solidFill>
-        <a:ln>
-          <a:noFill/>
-        </a:ln>
-        <a:effectLst/>
-      </dsp:spPr>
-      <dsp:style>
-        <a:lnRef idx="0">
-          <a:scrgbClr r="0" g="0" b="0"/>
-        </a:lnRef>
-        <a:fillRef idx="1">
-          <a:scrgbClr r="0" g="0" b="0"/>
-        </a:fillRef>
-        <a:effectRef idx="0">
-          <a:scrgbClr r="0" g="0" b="0"/>
-        </a:effectRef>
-        <a:fontRef idx="minor">
-          <a:schemeClr val="lt1"/>
-        </a:fontRef>
-      </dsp:style>
-      <dsp:txBody>
-        <a:bodyPr spcFirstLastPara="0" vert="horz" wrap="square" lIns="0" tIns="0" rIns="0" bIns="0" numCol="1" spcCol="1270" anchor="ctr" anchorCtr="0">
-          <a:noAutofit/>
-        </a:bodyPr>
-        <a:lstStyle/>
-        <a:p>
-          <a:pPr lvl="0" algn="ctr" defTabSz="622300">
-            <a:lnSpc>
-              <a:spcPct val="90000"/>
-            </a:lnSpc>
-            <a:spcBef>
-              <a:spcPct val="0"/>
-            </a:spcBef>
-            <a:spcAft>
-              <a:spcPct val="35000"/>
-            </a:spcAft>
-          </a:pPr>
-          <a:endParaRPr lang="en-US" sz="1400" kern="1200"/>
-        </a:p>
-      </dsp:txBody>
-      <dsp:txXfrm>
-        <a:off x="7884389" y="2025346"/>
-        <a:ext cx="299835" cy="300644"/>
-      </dsp:txXfrm>
-    </dsp:sp>
-    <dsp:sp modelId="{2E14C3FF-DB5C-4362-B5A5-000EC0CBCE97}">
-      <dsp:nvSpPr>
-        <dsp:cNvPr id="0" name=""/>
-        <dsp:cNvSpPr/>
-      </dsp:nvSpPr>
-      <dsp:spPr>
-        <a:xfrm>
-          <a:off x="8490525" y="1569532"/>
-          <a:ext cx="2020453" cy="1212272"/>
-        </a:xfrm>
-        <a:prstGeom prst="roundRect">
-          <a:avLst>
-            <a:gd name="adj" fmla="val 10000"/>
-          </a:avLst>
-        </a:prstGeom>
-        <a:solidFill>
-          <a:schemeClr val="accent1">
-            <a:hueOff val="0"/>
-            <a:satOff val="0"/>
-            <a:lumOff val="0"/>
-            <a:alphaOff val="0"/>
-          </a:schemeClr>
-        </a:solidFill>
-        <a:ln w="12700" cap="flat" cmpd="sng" algn="ctr">
-          <a:solidFill>
-            <a:schemeClr val="lt1">
-              <a:hueOff val="0"/>
-              <a:satOff val="0"/>
-              <a:lumOff val="0"/>
-              <a:alphaOff val="0"/>
-            </a:schemeClr>
-          </a:solidFill>
-          <a:prstDash val="solid"/>
-          <a:miter lim="800000"/>
-        </a:ln>
-        <a:effectLst/>
-      </dsp:spPr>
-      <dsp:style>
-        <a:lnRef idx="2">
-          <a:scrgbClr r="0" g="0" b="0"/>
-        </a:lnRef>
-        <a:fillRef idx="1">
-          <a:scrgbClr r="0" g="0" b="0"/>
-        </a:fillRef>
-        <a:effectRef idx="0">
-          <a:scrgbClr r="0" g="0" b="0"/>
-        </a:effectRef>
-        <a:fontRef idx="minor">
-          <a:schemeClr val="lt1"/>
-        </a:fontRef>
-      </dsp:style>
-      <dsp:txBody>
-        <a:bodyPr spcFirstLastPara="0" vert="horz" wrap="square" lIns="64770" tIns="64770" rIns="64770" bIns="64770" numCol="1" spcCol="1270" anchor="ctr" anchorCtr="0">
-          <a:noAutofit/>
-        </a:bodyPr>
-        <a:lstStyle/>
-        <a:p>
-          <a:pPr lvl="0" algn="ctr" defTabSz="755650">
-            <a:lnSpc>
-              <a:spcPct val="90000"/>
-            </a:lnSpc>
-            <a:spcBef>
-              <a:spcPct val="0"/>
-            </a:spcBef>
-            <a:spcAft>
-              <a:spcPct val="35000"/>
-            </a:spcAft>
-          </a:pPr>
-          <a:r>
-            <a:rPr lang="en-US" sz="1700" kern="1200" dirty="0" smtClean="0"/>
-            <a:t>Emit: (URL,WORD,COUNT)</a:t>
-          </a:r>
-          <a:br>
-            <a:rPr lang="en-US" sz="1700" kern="1200" dirty="0" smtClean="0"/>
-          </a:br>
-          <a:r>
-            <a:rPr lang="en-US" sz="1700" kern="1200" dirty="0" smtClean="0"/>
-            <a:t>Separated by tabs. URL is key.</a:t>
-          </a:r>
-          <a:endParaRPr lang="en-US" sz="1700" kern="1200" dirty="0"/>
-        </a:p>
-      </dsp:txBody>
-      <dsp:txXfrm>
-        <a:off x="8526031" y="1605038"/>
-        <a:ext cx="1949441" cy="1141260"/>
-      </dsp:txXfrm>
-    </dsp:sp>
   </dsp:spTree>
 </dsp:drawing>
 </file>
@@ -3931,530 +3394,6 @@
       <dsp:cNvGrpSpPr/>
     </dsp:nvGrpSpPr>
     <dsp:grpSpPr/>
-    <dsp:sp modelId="{2CCB3FBF-61E2-4489-9A2F-FAB5D6A8765A}">
-      <dsp:nvSpPr>
-        <dsp:cNvPr id="0" name=""/>
-        <dsp:cNvSpPr/>
-      </dsp:nvSpPr>
-      <dsp:spPr>
-        <a:xfrm>
-          <a:off x="4621" y="1569532"/>
-          <a:ext cx="2020453" cy="1212272"/>
-        </a:xfrm>
-        <a:prstGeom prst="roundRect">
-          <a:avLst>
-            <a:gd name="adj" fmla="val 10000"/>
-          </a:avLst>
-        </a:prstGeom>
-        <a:solidFill>
-          <a:schemeClr val="accent5">
-            <a:hueOff val="0"/>
-            <a:satOff val="0"/>
-            <a:lumOff val="0"/>
-            <a:alphaOff val="0"/>
-          </a:schemeClr>
-        </a:solidFill>
-        <a:ln w="12700" cap="flat" cmpd="sng" algn="ctr">
-          <a:solidFill>
-            <a:schemeClr val="lt1">
-              <a:hueOff val="0"/>
-              <a:satOff val="0"/>
-              <a:lumOff val="0"/>
-              <a:alphaOff val="0"/>
-            </a:schemeClr>
-          </a:solidFill>
-          <a:prstDash val="solid"/>
-          <a:miter lim="800000"/>
-        </a:ln>
-        <a:effectLst/>
-      </dsp:spPr>
-      <dsp:style>
-        <a:lnRef idx="2">
-          <a:scrgbClr r="0" g="0" b="0"/>
-        </a:lnRef>
-        <a:fillRef idx="1">
-          <a:scrgbClr r="0" g="0" b="0"/>
-        </a:fillRef>
-        <a:effectRef idx="0">
-          <a:scrgbClr r="0" g="0" b="0"/>
-        </a:effectRef>
-        <a:fontRef idx="minor">
-          <a:schemeClr val="lt1"/>
-        </a:fontRef>
-      </dsp:style>
-      <dsp:txBody>
-        <a:bodyPr spcFirstLastPara="0" vert="horz" wrap="square" lIns="64770" tIns="64770" rIns="64770" bIns="64770" numCol="1" spcCol="1270" anchor="ctr" anchorCtr="0">
-          <a:noAutofit/>
-        </a:bodyPr>
-        <a:lstStyle/>
-        <a:p>
-          <a:pPr lvl="0" algn="ctr" defTabSz="755650">
-            <a:lnSpc>
-              <a:spcPct val="90000"/>
-            </a:lnSpc>
-            <a:spcBef>
-              <a:spcPct val="0"/>
-            </a:spcBef>
-            <a:spcAft>
-              <a:spcPct val="35000"/>
-            </a:spcAft>
-          </a:pPr>
-          <a:r>
-            <a:rPr lang="en-US" sz="1700" kern="1200" dirty="0" smtClean="0"/>
-            <a:t>(URL,WORD,COUNT)  From previous mapper</a:t>
-          </a:r>
-          <a:endParaRPr lang="en-US" sz="1700" kern="1200" dirty="0"/>
-        </a:p>
-      </dsp:txBody>
-      <dsp:txXfrm>
-        <a:off x="40127" y="1605038"/>
-        <a:ext cx="1949441" cy="1141260"/>
-      </dsp:txXfrm>
-    </dsp:sp>
-    <dsp:sp modelId="{C6BBAB1C-8441-4ED1-9F7B-1AE83F583C7D}">
-      <dsp:nvSpPr>
-        <dsp:cNvPr id="0" name=""/>
-        <dsp:cNvSpPr/>
-      </dsp:nvSpPr>
-      <dsp:spPr>
-        <a:xfrm>
-          <a:off x="2227119" y="1925132"/>
-          <a:ext cx="428336" cy="501072"/>
-        </a:xfrm>
-        <a:prstGeom prst="rightArrow">
-          <a:avLst>
-            <a:gd name="adj1" fmla="val 60000"/>
-            <a:gd name="adj2" fmla="val 50000"/>
-          </a:avLst>
-        </a:prstGeom>
-        <a:solidFill>
-          <a:schemeClr val="accent5">
-            <a:hueOff val="0"/>
-            <a:satOff val="0"/>
-            <a:lumOff val="0"/>
-            <a:alphaOff val="0"/>
-          </a:schemeClr>
-        </a:solidFill>
-        <a:ln>
-          <a:noFill/>
-        </a:ln>
-        <a:effectLst/>
-      </dsp:spPr>
-      <dsp:style>
-        <a:lnRef idx="0">
-          <a:scrgbClr r="0" g="0" b="0"/>
-        </a:lnRef>
-        <a:fillRef idx="1">
-          <a:scrgbClr r="0" g="0" b="0"/>
-        </a:fillRef>
-        <a:effectRef idx="0">
-          <a:scrgbClr r="0" g="0" b="0"/>
-        </a:effectRef>
-        <a:fontRef idx="minor">
-          <a:schemeClr val="lt1"/>
-        </a:fontRef>
-      </dsp:style>
-      <dsp:txBody>
-        <a:bodyPr spcFirstLastPara="0" vert="horz" wrap="square" lIns="0" tIns="0" rIns="0" bIns="0" numCol="1" spcCol="1270" anchor="ctr" anchorCtr="0">
-          <a:noAutofit/>
-        </a:bodyPr>
-        <a:lstStyle/>
-        <a:p>
-          <a:pPr lvl="0" algn="ctr" defTabSz="622300">
-            <a:lnSpc>
-              <a:spcPct val="90000"/>
-            </a:lnSpc>
-            <a:spcBef>
-              <a:spcPct val="0"/>
-            </a:spcBef>
-            <a:spcAft>
-              <a:spcPct val="35000"/>
-            </a:spcAft>
-          </a:pPr>
-          <a:endParaRPr lang="en-US" sz="1400" kern="1200"/>
-        </a:p>
-      </dsp:txBody>
-      <dsp:txXfrm>
-        <a:off x="2227119" y="2025346"/>
-        <a:ext cx="299835" cy="300644"/>
-      </dsp:txXfrm>
-    </dsp:sp>
-    <dsp:sp modelId="{F82ABD8B-F336-419A-8ED9-2F319D067C56}">
-      <dsp:nvSpPr>
-        <dsp:cNvPr id="0" name=""/>
-        <dsp:cNvSpPr/>
-      </dsp:nvSpPr>
-      <dsp:spPr>
-        <a:xfrm>
-          <a:off x="2833255" y="1569532"/>
-          <a:ext cx="2020453" cy="1212272"/>
-        </a:xfrm>
-        <a:prstGeom prst="roundRect">
-          <a:avLst>
-            <a:gd name="adj" fmla="val 10000"/>
-          </a:avLst>
-        </a:prstGeom>
-        <a:solidFill>
-          <a:schemeClr val="accent5">
-            <a:hueOff val="-2451115"/>
-            <a:satOff val="-3409"/>
-            <a:lumOff val="-1307"/>
-            <a:alphaOff val="0"/>
-          </a:schemeClr>
-        </a:solidFill>
-        <a:ln w="12700" cap="flat" cmpd="sng" algn="ctr">
-          <a:solidFill>
-            <a:schemeClr val="lt1">
-              <a:hueOff val="0"/>
-              <a:satOff val="0"/>
-              <a:lumOff val="0"/>
-              <a:alphaOff val="0"/>
-            </a:schemeClr>
-          </a:solidFill>
-          <a:prstDash val="solid"/>
-          <a:miter lim="800000"/>
-        </a:ln>
-        <a:effectLst/>
-      </dsp:spPr>
-      <dsp:style>
-        <a:lnRef idx="2">
-          <a:scrgbClr r="0" g="0" b="0"/>
-        </a:lnRef>
-        <a:fillRef idx="1">
-          <a:scrgbClr r="0" g="0" b="0"/>
-        </a:fillRef>
-        <a:effectRef idx="0">
-          <a:scrgbClr r="0" g="0" b="0"/>
-        </a:effectRef>
-        <a:fontRef idx="minor">
-          <a:schemeClr val="lt1"/>
-        </a:fontRef>
-      </dsp:style>
-      <dsp:txBody>
-        <a:bodyPr spcFirstLastPara="0" vert="horz" wrap="square" lIns="64770" tIns="64770" rIns="64770" bIns="64770" numCol="1" spcCol="1270" anchor="ctr" anchorCtr="0">
-          <a:noAutofit/>
-        </a:bodyPr>
-        <a:lstStyle/>
-        <a:p>
-          <a:pPr lvl="0" algn="ctr" defTabSz="755650">
-            <a:lnSpc>
-              <a:spcPct val="90000"/>
-            </a:lnSpc>
-            <a:spcBef>
-              <a:spcPct val="0"/>
-            </a:spcBef>
-            <a:spcAft>
-              <a:spcPct val="35000"/>
-            </a:spcAft>
-          </a:pPr>
-          <a:r>
-            <a:rPr lang="en-US" sz="1700" kern="1200" dirty="0" smtClean="0"/>
-            <a:t>Count how many documents each word appears in.</a:t>
-          </a:r>
-          <a:endParaRPr lang="en-US" sz="1700" kern="1200" dirty="0"/>
-        </a:p>
-      </dsp:txBody>
-      <dsp:txXfrm>
-        <a:off x="2868761" y="1605038"/>
-        <a:ext cx="1949441" cy="1141260"/>
-      </dsp:txXfrm>
-    </dsp:sp>
-    <dsp:sp modelId="{D7F30FBA-81D7-4F92-A987-120A33E90E02}">
-      <dsp:nvSpPr>
-        <dsp:cNvPr id="0" name=""/>
-        <dsp:cNvSpPr/>
-      </dsp:nvSpPr>
-      <dsp:spPr>
-        <a:xfrm>
-          <a:off x="5055754" y="1925132"/>
-          <a:ext cx="428336" cy="501072"/>
-        </a:xfrm>
-        <a:prstGeom prst="rightArrow">
-          <a:avLst>
-            <a:gd name="adj1" fmla="val 60000"/>
-            <a:gd name="adj2" fmla="val 50000"/>
-          </a:avLst>
-        </a:prstGeom>
-        <a:solidFill>
-          <a:schemeClr val="accent5">
-            <a:hueOff val="-3676672"/>
-            <a:satOff val="-5114"/>
-            <a:lumOff val="-1961"/>
-            <a:alphaOff val="0"/>
-          </a:schemeClr>
-        </a:solidFill>
-        <a:ln>
-          <a:noFill/>
-        </a:ln>
-        <a:effectLst/>
-      </dsp:spPr>
-      <dsp:style>
-        <a:lnRef idx="0">
-          <a:scrgbClr r="0" g="0" b="0"/>
-        </a:lnRef>
-        <a:fillRef idx="1">
-          <a:scrgbClr r="0" g="0" b="0"/>
-        </a:fillRef>
-        <a:effectRef idx="0">
-          <a:scrgbClr r="0" g="0" b="0"/>
-        </a:effectRef>
-        <a:fontRef idx="minor">
-          <a:schemeClr val="lt1"/>
-        </a:fontRef>
-      </dsp:style>
-      <dsp:txBody>
-        <a:bodyPr spcFirstLastPara="0" vert="horz" wrap="square" lIns="0" tIns="0" rIns="0" bIns="0" numCol="1" spcCol="1270" anchor="ctr" anchorCtr="0">
-          <a:noAutofit/>
-        </a:bodyPr>
-        <a:lstStyle/>
-        <a:p>
-          <a:pPr lvl="0" algn="ctr" defTabSz="622300">
-            <a:lnSpc>
-              <a:spcPct val="90000"/>
-            </a:lnSpc>
-            <a:spcBef>
-              <a:spcPct val="0"/>
-            </a:spcBef>
-            <a:spcAft>
-              <a:spcPct val="35000"/>
-            </a:spcAft>
-          </a:pPr>
-          <a:endParaRPr lang="en-US" sz="1400" kern="1200"/>
-        </a:p>
-      </dsp:txBody>
-      <dsp:txXfrm>
-        <a:off x="5055754" y="2025346"/>
-        <a:ext cx="299835" cy="300644"/>
-      </dsp:txXfrm>
-    </dsp:sp>
-    <dsp:sp modelId="{FB687F3F-0590-4628-A043-32446B5DD71C}">
-      <dsp:nvSpPr>
-        <dsp:cNvPr id="0" name=""/>
-        <dsp:cNvSpPr/>
-      </dsp:nvSpPr>
-      <dsp:spPr>
-        <a:xfrm>
-          <a:off x="5661890" y="1569532"/>
-          <a:ext cx="2020453" cy="1212272"/>
-        </a:xfrm>
-        <a:prstGeom prst="roundRect">
-          <a:avLst>
-            <a:gd name="adj" fmla="val 10000"/>
-          </a:avLst>
-        </a:prstGeom>
-        <a:solidFill>
-          <a:schemeClr val="accent5">
-            <a:hueOff val="-4902230"/>
-            <a:satOff val="-6819"/>
-            <a:lumOff val="-2615"/>
-            <a:alphaOff val="0"/>
-          </a:schemeClr>
-        </a:solidFill>
-        <a:ln w="12700" cap="flat" cmpd="sng" algn="ctr">
-          <a:solidFill>
-            <a:schemeClr val="lt1">
-              <a:hueOff val="0"/>
-              <a:satOff val="0"/>
-              <a:lumOff val="0"/>
-              <a:alphaOff val="0"/>
-            </a:schemeClr>
-          </a:solidFill>
-          <a:prstDash val="solid"/>
-          <a:miter lim="800000"/>
-        </a:ln>
-        <a:effectLst/>
-      </dsp:spPr>
-      <dsp:style>
-        <a:lnRef idx="2">
-          <a:scrgbClr r="0" g="0" b="0"/>
-        </a:lnRef>
-        <a:fillRef idx="1">
-          <a:scrgbClr r="0" g="0" b="0"/>
-        </a:fillRef>
-        <a:effectRef idx="0">
-          <a:scrgbClr r="0" g="0" b="0"/>
-        </a:effectRef>
-        <a:fontRef idx="minor">
-          <a:schemeClr val="lt1"/>
-        </a:fontRef>
-      </dsp:style>
-      <dsp:txBody>
-        <a:bodyPr spcFirstLastPara="0" vert="horz" wrap="square" lIns="64770" tIns="64770" rIns="64770" bIns="64770" numCol="1" spcCol="1270" anchor="ctr" anchorCtr="0">
-          <a:noAutofit/>
-        </a:bodyPr>
-        <a:lstStyle/>
-        <a:p>
-          <a:pPr lvl="0" algn="ctr" defTabSz="755650">
-            <a:lnSpc>
-              <a:spcPct val="90000"/>
-            </a:lnSpc>
-            <a:spcBef>
-              <a:spcPct val="0"/>
-            </a:spcBef>
-            <a:spcAft>
-              <a:spcPct val="35000"/>
-            </a:spcAft>
-          </a:pPr>
-          <a:r>
-            <a:rPr lang="en-US" sz="1700" kern="1200" dirty="0" smtClean="0"/>
-            <a:t>Count the total number of words (N)</a:t>
-          </a:r>
-          <a:endParaRPr lang="en-US" sz="1700" kern="1200" dirty="0"/>
-        </a:p>
-      </dsp:txBody>
-      <dsp:txXfrm>
-        <a:off x="5697396" y="1605038"/>
-        <a:ext cx="1949441" cy="1141260"/>
-      </dsp:txXfrm>
-    </dsp:sp>
-    <dsp:sp modelId="{2A00525E-DAFE-46B4-8A28-FB4F2E89ADA8}">
-      <dsp:nvSpPr>
-        <dsp:cNvPr id="0" name=""/>
-        <dsp:cNvSpPr/>
-      </dsp:nvSpPr>
-      <dsp:spPr>
-        <a:xfrm>
-          <a:off x="7884389" y="1925132"/>
-          <a:ext cx="428336" cy="501072"/>
-        </a:xfrm>
-        <a:prstGeom prst="rightArrow">
-          <a:avLst>
-            <a:gd name="adj1" fmla="val 60000"/>
-            <a:gd name="adj2" fmla="val 50000"/>
-          </a:avLst>
-        </a:prstGeom>
-        <a:solidFill>
-          <a:schemeClr val="accent5">
-            <a:hueOff val="-7353344"/>
-            <a:satOff val="-10228"/>
-            <a:lumOff val="-3922"/>
-            <a:alphaOff val="0"/>
-          </a:schemeClr>
-        </a:solidFill>
-        <a:ln>
-          <a:noFill/>
-        </a:ln>
-        <a:effectLst/>
-      </dsp:spPr>
-      <dsp:style>
-        <a:lnRef idx="0">
-          <a:scrgbClr r="0" g="0" b="0"/>
-        </a:lnRef>
-        <a:fillRef idx="1">
-          <a:scrgbClr r="0" g="0" b="0"/>
-        </a:fillRef>
-        <a:effectRef idx="0">
-          <a:scrgbClr r="0" g="0" b="0"/>
-        </a:effectRef>
-        <a:fontRef idx="minor">
-          <a:schemeClr val="lt1"/>
-        </a:fontRef>
-      </dsp:style>
-      <dsp:txBody>
-        <a:bodyPr spcFirstLastPara="0" vert="horz" wrap="square" lIns="0" tIns="0" rIns="0" bIns="0" numCol="1" spcCol="1270" anchor="ctr" anchorCtr="0">
-          <a:noAutofit/>
-        </a:bodyPr>
-        <a:lstStyle/>
-        <a:p>
-          <a:pPr lvl="0" algn="ctr" defTabSz="622300">
-            <a:lnSpc>
-              <a:spcPct val="90000"/>
-            </a:lnSpc>
-            <a:spcBef>
-              <a:spcPct val="0"/>
-            </a:spcBef>
-            <a:spcAft>
-              <a:spcPct val="35000"/>
-            </a:spcAft>
-          </a:pPr>
-          <a:endParaRPr lang="en-US" sz="1400" kern="1200"/>
-        </a:p>
-      </dsp:txBody>
-      <dsp:txXfrm>
-        <a:off x="7884389" y="2025346"/>
-        <a:ext cx="299835" cy="300644"/>
-      </dsp:txXfrm>
-    </dsp:sp>
-    <dsp:sp modelId="{2E14C3FF-DB5C-4362-B5A5-000EC0CBCE97}">
-      <dsp:nvSpPr>
-        <dsp:cNvPr id="0" name=""/>
-        <dsp:cNvSpPr/>
-      </dsp:nvSpPr>
-      <dsp:spPr>
-        <a:xfrm>
-          <a:off x="8490525" y="1569532"/>
-          <a:ext cx="2020453" cy="1212272"/>
-        </a:xfrm>
-        <a:prstGeom prst="roundRect">
-          <a:avLst>
-            <a:gd name="adj" fmla="val 10000"/>
-          </a:avLst>
-        </a:prstGeom>
-        <a:solidFill>
-          <a:schemeClr val="accent5">
-            <a:hueOff val="-7353344"/>
-            <a:satOff val="-10228"/>
-            <a:lumOff val="-3922"/>
-            <a:alphaOff val="0"/>
-          </a:schemeClr>
-        </a:solidFill>
-        <a:ln w="12700" cap="flat" cmpd="sng" algn="ctr">
-          <a:solidFill>
-            <a:schemeClr val="lt1">
-              <a:hueOff val="0"/>
-              <a:satOff val="0"/>
-              <a:lumOff val="0"/>
-              <a:alphaOff val="0"/>
-            </a:schemeClr>
-          </a:solidFill>
-          <a:prstDash val="solid"/>
-          <a:miter lim="800000"/>
-        </a:ln>
-        <a:effectLst/>
-      </dsp:spPr>
-      <dsp:style>
-        <a:lnRef idx="2">
-          <a:scrgbClr r="0" g="0" b="0"/>
-        </a:lnRef>
-        <a:fillRef idx="1">
-          <a:scrgbClr r="0" g="0" b="0"/>
-        </a:fillRef>
-        <a:effectRef idx="0">
-          <a:scrgbClr r="0" g="0" b="0"/>
-        </a:effectRef>
-        <a:fontRef idx="minor">
-          <a:schemeClr val="lt1"/>
-        </a:fontRef>
-      </dsp:style>
-      <dsp:txBody>
-        <a:bodyPr spcFirstLastPara="0" vert="horz" wrap="square" lIns="64770" tIns="64770" rIns="64770" bIns="64770" numCol="1" spcCol="1270" anchor="ctr" anchorCtr="0">
-          <a:noAutofit/>
-        </a:bodyPr>
-        <a:lstStyle/>
-        <a:p>
-          <a:pPr lvl="0" algn="ctr" defTabSz="755650">
-            <a:lnSpc>
-              <a:spcPct val="90000"/>
-            </a:lnSpc>
-            <a:spcBef>
-              <a:spcPct val="0"/>
-            </a:spcBef>
-            <a:spcAft>
-              <a:spcPct val="35000"/>
-            </a:spcAft>
-          </a:pPr>
-          <a:r>
-            <a:rPr lang="en-US" sz="1700" kern="1200" dirty="0" err="1" smtClean="0"/>
-            <a:t>doc_freq.json</a:t>
-          </a:r>
-          <a:endParaRPr lang="en-US" sz="1700" kern="1200" dirty="0"/>
-        </a:p>
-      </dsp:txBody>
-      <dsp:txXfrm>
-        <a:off x="8526031" y="1605038"/>
-        <a:ext cx="1949441" cy="1141260"/>
-      </dsp:txXfrm>
-    </dsp:sp>
   </dsp:spTree>
 </dsp:drawing>
 </file>
@@ -4467,411 +3406,6 @@
       <dsp:cNvGrpSpPr/>
     </dsp:nvGrpSpPr>
     <dsp:grpSpPr/>
-    <dsp:sp modelId="{57822964-2392-40EC-85E4-20F152301F81}">
-      <dsp:nvSpPr>
-        <dsp:cNvPr id="0" name=""/>
-        <dsp:cNvSpPr/>
-      </dsp:nvSpPr>
-      <dsp:spPr>
-        <a:xfrm>
-          <a:off x="9242" y="1346949"/>
-          <a:ext cx="2762398" cy="1657439"/>
-        </a:xfrm>
-        <a:prstGeom prst="roundRect">
-          <a:avLst>
-            <a:gd name="adj" fmla="val 10000"/>
-          </a:avLst>
-        </a:prstGeom>
-        <a:solidFill>
-          <a:schemeClr val="accent5">
-            <a:hueOff val="0"/>
-            <a:satOff val="0"/>
-            <a:lumOff val="0"/>
-            <a:alphaOff val="0"/>
-          </a:schemeClr>
-        </a:solidFill>
-        <a:ln w="12700" cap="flat" cmpd="sng" algn="ctr">
-          <a:solidFill>
-            <a:schemeClr val="lt1">
-              <a:hueOff val="0"/>
-              <a:satOff val="0"/>
-              <a:lumOff val="0"/>
-              <a:alphaOff val="0"/>
-            </a:schemeClr>
-          </a:solidFill>
-          <a:prstDash val="solid"/>
-          <a:miter lim="800000"/>
-        </a:ln>
-        <a:effectLst/>
-      </dsp:spPr>
-      <dsp:style>
-        <a:lnRef idx="2">
-          <a:scrgbClr r="0" g="0" b="0"/>
-        </a:lnRef>
-        <a:fillRef idx="1">
-          <a:scrgbClr r="0" g="0" b="0"/>
-        </a:fillRef>
-        <a:effectRef idx="0">
-          <a:scrgbClr r="0" g="0" b="0"/>
-        </a:effectRef>
-        <a:fontRef idx="minor">
-          <a:schemeClr val="lt1"/>
-        </a:fontRef>
-      </dsp:style>
-      <dsp:txBody>
-        <a:bodyPr spcFirstLastPara="0" vert="horz" wrap="square" lIns="87630" tIns="87630" rIns="87630" bIns="87630" numCol="1" spcCol="1270" anchor="ctr" anchorCtr="0">
-          <a:noAutofit/>
-        </a:bodyPr>
-        <a:lstStyle/>
-        <a:p>
-          <a:pPr lvl="0" algn="ctr" defTabSz="1022350">
-            <a:lnSpc>
-              <a:spcPct val="90000"/>
-            </a:lnSpc>
-            <a:spcBef>
-              <a:spcPct val="0"/>
-            </a:spcBef>
-            <a:spcAft>
-              <a:spcPct val="35000"/>
-            </a:spcAft>
-          </a:pPr>
-          <a:r>
-            <a:rPr lang="en-US" sz="2300" kern="1200" dirty="0" smtClean="0"/>
-            <a:t>(URL,WORD,COUNT)</a:t>
-          </a:r>
-          <a:endParaRPr lang="en-US" sz="2300" kern="1200" dirty="0"/>
-        </a:p>
-      </dsp:txBody>
-      <dsp:txXfrm>
-        <a:off x="57787" y="1395494"/>
-        <a:ext cx="2665308" cy="1560349"/>
-      </dsp:txXfrm>
-    </dsp:sp>
-    <dsp:sp modelId="{6C1FC4BC-1E72-496C-A0C3-422352D72408}">
-      <dsp:nvSpPr>
-        <dsp:cNvPr id="0" name=""/>
-        <dsp:cNvSpPr/>
-      </dsp:nvSpPr>
-      <dsp:spPr>
-        <a:xfrm>
-          <a:off x="3047880" y="1833131"/>
-          <a:ext cx="585628" cy="685074"/>
-        </a:xfrm>
-        <a:prstGeom prst="rightArrow">
-          <a:avLst>
-            <a:gd name="adj1" fmla="val 60000"/>
-            <a:gd name="adj2" fmla="val 50000"/>
-          </a:avLst>
-        </a:prstGeom>
-        <a:solidFill>
-          <a:schemeClr val="accent5">
-            <a:hueOff val="0"/>
-            <a:satOff val="0"/>
-            <a:lumOff val="0"/>
-            <a:alphaOff val="0"/>
-          </a:schemeClr>
-        </a:solidFill>
-        <a:ln>
-          <a:noFill/>
-        </a:ln>
-        <a:effectLst/>
-      </dsp:spPr>
-      <dsp:style>
-        <a:lnRef idx="0">
-          <a:scrgbClr r="0" g="0" b="0"/>
-        </a:lnRef>
-        <a:fillRef idx="1">
-          <a:scrgbClr r="0" g="0" b="0"/>
-        </a:fillRef>
-        <a:effectRef idx="0">
-          <a:scrgbClr r="0" g="0" b="0"/>
-        </a:effectRef>
-        <a:fontRef idx="minor">
-          <a:schemeClr val="lt1"/>
-        </a:fontRef>
-      </dsp:style>
-      <dsp:txBody>
-        <a:bodyPr spcFirstLastPara="0" vert="horz" wrap="square" lIns="0" tIns="0" rIns="0" bIns="0" numCol="1" spcCol="1270" anchor="ctr" anchorCtr="0">
-          <a:noAutofit/>
-        </a:bodyPr>
-        <a:lstStyle/>
-        <a:p>
-          <a:pPr lvl="0" algn="ctr" defTabSz="844550">
-            <a:lnSpc>
-              <a:spcPct val="90000"/>
-            </a:lnSpc>
-            <a:spcBef>
-              <a:spcPct val="0"/>
-            </a:spcBef>
-            <a:spcAft>
-              <a:spcPct val="35000"/>
-            </a:spcAft>
-          </a:pPr>
-          <a:endParaRPr lang="en-US" sz="1900" kern="1200"/>
-        </a:p>
-      </dsp:txBody>
-      <dsp:txXfrm>
-        <a:off x="3047880" y="1970146"/>
-        <a:ext cx="409940" cy="411044"/>
-      </dsp:txXfrm>
-    </dsp:sp>
-    <dsp:sp modelId="{01E74070-BC89-4E6C-B7B6-2C389AC66633}">
-      <dsp:nvSpPr>
-        <dsp:cNvPr id="0" name=""/>
-        <dsp:cNvSpPr/>
-      </dsp:nvSpPr>
-      <dsp:spPr>
-        <a:xfrm>
-          <a:off x="3876600" y="1346949"/>
-          <a:ext cx="2762398" cy="1657439"/>
-        </a:xfrm>
-        <a:prstGeom prst="roundRect">
-          <a:avLst>
-            <a:gd name="adj" fmla="val 10000"/>
-          </a:avLst>
-        </a:prstGeom>
-        <a:solidFill>
-          <a:schemeClr val="accent5">
-            <a:hueOff val="-3676672"/>
-            <a:satOff val="-5114"/>
-            <a:lumOff val="-1961"/>
-            <a:alphaOff val="0"/>
-          </a:schemeClr>
-        </a:solidFill>
-        <a:ln w="12700" cap="flat" cmpd="sng" algn="ctr">
-          <a:solidFill>
-            <a:schemeClr val="lt1">
-              <a:hueOff val="0"/>
-              <a:satOff val="0"/>
-              <a:lumOff val="0"/>
-              <a:alphaOff val="0"/>
-            </a:schemeClr>
-          </a:solidFill>
-          <a:prstDash val="solid"/>
-          <a:miter lim="800000"/>
-        </a:ln>
-        <a:effectLst/>
-      </dsp:spPr>
-      <dsp:style>
-        <a:lnRef idx="2">
-          <a:scrgbClr r="0" g="0" b="0"/>
-        </a:lnRef>
-        <a:fillRef idx="1">
-          <a:scrgbClr r="0" g="0" b="0"/>
-        </a:fillRef>
-        <a:effectRef idx="0">
-          <a:scrgbClr r="0" g="0" b="0"/>
-        </a:effectRef>
-        <a:fontRef idx="minor">
-          <a:schemeClr val="lt1"/>
-        </a:fontRef>
-      </dsp:style>
-      <dsp:txBody>
-        <a:bodyPr spcFirstLastPara="0" vert="horz" wrap="square" lIns="87630" tIns="87630" rIns="87630" bIns="87630" numCol="1" spcCol="1270" anchor="ctr" anchorCtr="0">
-          <a:noAutofit/>
-        </a:bodyPr>
-        <a:lstStyle/>
-        <a:p>
-          <a:pPr lvl="0" algn="ctr" defTabSz="1022350">
-            <a:lnSpc>
-              <a:spcPct val="90000"/>
-            </a:lnSpc>
-            <a:spcBef>
-              <a:spcPct val="0"/>
-            </a:spcBef>
-            <a:spcAft>
-              <a:spcPct val="35000"/>
-            </a:spcAft>
-          </a:pPr>
-          <a:r>
-            <a:rPr lang="en-US" sz="2300" kern="1200" dirty="0" err="1" smtClean="0"/>
-            <a:t>tf-idf</a:t>
-          </a:r>
-          <a:r>
-            <a:rPr lang="en-US" sz="2300" kern="1200" dirty="0" smtClean="0"/>
-            <a:t> vectors</a:t>
-          </a:r>
-          <a:endParaRPr lang="en-US" sz="2300" kern="1200" dirty="0"/>
-        </a:p>
-      </dsp:txBody>
-      <dsp:txXfrm>
-        <a:off x="3925145" y="1395494"/>
-        <a:ext cx="2665308" cy="1560349"/>
-      </dsp:txXfrm>
-    </dsp:sp>
-    <dsp:sp modelId="{B640E2EA-7CD7-4A75-9991-ABAA1449AC7D}">
-      <dsp:nvSpPr>
-        <dsp:cNvPr id="0" name=""/>
-        <dsp:cNvSpPr/>
-      </dsp:nvSpPr>
-      <dsp:spPr>
-        <a:xfrm>
-          <a:off x="6915239" y="1833131"/>
-          <a:ext cx="585628" cy="685074"/>
-        </a:xfrm>
-        <a:prstGeom prst="rightArrow">
-          <a:avLst>
-            <a:gd name="adj1" fmla="val 60000"/>
-            <a:gd name="adj2" fmla="val 50000"/>
-          </a:avLst>
-        </a:prstGeom>
-        <a:solidFill>
-          <a:schemeClr val="accent5">
-            <a:hueOff val="-7353344"/>
-            <a:satOff val="-10228"/>
-            <a:lumOff val="-3922"/>
-            <a:alphaOff val="0"/>
-          </a:schemeClr>
-        </a:solidFill>
-        <a:ln>
-          <a:noFill/>
-        </a:ln>
-        <a:effectLst/>
-      </dsp:spPr>
-      <dsp:style>
-        <a:lnRef idx="0">
-          <a:scrgbClr r="0" g="0" b="0"/>
-        </a:lnRef>
-        <a:fillRef idx="1">
-          <a:scrgbClr r="0" g="0" b="0"/>
-        </a:fillRef>
-        <a:effectRef idx="0">
-          <a:scrgbClr r="0" g="0" b="0"/>
-        </a:effectRef>
-        <a:fontRef idx="minor">
-          <a:schemeClr val="lt1"/>
-        </a:fontRef>
-      </dsp:style>
-      <dsp:txBody>
-        <a:bodyPr spcFirstLastPara="0" vert="horz" wrap="square" lIns="0" tIns="0" rIns="0" bIns="0" numCol="1" spcCol="1270" anchor="ctr" anchorCtr="0">
-          <a:noAutofit/>
-        </a:bodyPr>
-        <a:lstStyle/>
-        <a:p>
-          <a:pPr lvl="0" algn="ctr" defTabSz="844550">
-            <a:lnSpc>
-              <a:spcPct val="90000"/>
-            </a:lnSpc>
-            <a:spcBef>
-              <a:spcPct val="0"/>
-            </a:spcBef>
-            <a:spcAft>
-              <a:spcPct val="35000"/>
-            </a:spcAft>
-          </a:pPr>
-          <a:endParaRPr lang="en-US" sz="1900" kern="1200"/>
-        </a:p>
-      </dsp:txBody>
-      <dsp:txXfrm>
-        <a:off x="6915239" y="1970146"/>
-        <a:ext cx="409940" cy="411044"/>
-      </dsp:txXfrm>
-    </dsp:sp>
-    <dsp:sp modelId="{201AA08F-03A7-47E4-BE01-E48D1FAB16DA}">
-      <dsp:nvSpPr>
-        <dsp:cNvPr id="0" name=""/>
-        <dsp:cNvSpPr/>
-      </dsp:nvSpPr>
-      <dsp:spPr>
-        <a:xfrm>
-          <a:off x="7743958" y="1346949"/>
-          <a:ext cx="2762398" cy="1657439"/>
-        </a:xfrm>
-        <a:prstGeom prst="roundRect">
-          <a:avLst>
-            <a:gd name="adj" fmla="val 10000"/>
-          </a:avLst>
-        </a:prstGeom>
-        <a:solidFill>
-          <a:schemeClr val="accent5">
-            <a:hueOff val="-7353344"/>
-            <a:satOff val="-10228"/>
-            <a:lumOff val="-3922"/>
-            <a:alphaOff val="0"/>
-          </a:schemeClr>
-        </a:solidFill>
-        <a:ln w="12700" cap="flat" cmpd="sng" algn="ctr">
-          <a:solidFill>
-            <a:schemeClr val="lt1">
-              <a:hueOff val="0"/>
-              <a:satOff val="0"/>
-              <a:lumOff val="0"/>
-              <a:alphaOff val="0"/>
-            </a:schemeClr>
-          </a:solidFill>
-          <a:prstDash val="solid"/>
-          <a:miter lim="800000"/>
-        </a:ln>
-        <a:effectLst/>
-      </dsp:spPr>
-      <dsp:style>
-        <a:lnRef idx="2">
-          <a:scrgbClr r="0" g="0" b="0"/>
-        </a:lnRef>
-        <a:fillRef idx="1">
-          <a:scrgbClr r="0" g="0" b="0"/>
-        </a:fillRef>
-        <a:effectRef idx="0">
-          <a:scrgbClr r="0" g="0" b="0"/>
-        </a:effectRef>
-        <a:fontRef idx="minor">
-          <a:schemeClr val="lt1"/>
-        </a:fontRef>
-      </dsp:style>
-      <dsp:txBody>
-        <a:bodyPr spcFirstLastPara="0" vert="horz" wrap="square" lIns="87630" tIns="87630" rIns="87630" bIns="87630" numCol="1" spcCol="1270" anchor="ctr" anchorCtr="0">
-          <a:noAutofit/>
-        </a:bodyPr>
-        <a:lstStyle/>
-        <a:p>
-          <a:pPr lvl="0" algn="ctr" defTabSz="1022350">
-            <a:lnSpc>
-              <a:spcPct val="90000"/>
-            </a:lnSpc>
-            <a:spcBef>
-              <a:spcPct val="0"/>
-            </a:spcBef>
-            <a:spcAft>
-              <a:spcPct val="35000"/>
-            </a:spcAft>
-          </a:pPr>
-          <a:r>
-            <a:rPr lang="en-US" sz="2300" kern="1200" dirty="0" smtClean="0"/>
-            <a:t>Emitted: (URL, </a:t>
-          </a:r>
-          <a:r>
-            <a:rPr lang="en-US" sz="2300" kern="1200" dirty="0" err="1" smtClean="0"/>
-            <a:t>tf-idf</a:t>
-          </a:r>
-          <a:r>
-            <a:rPr lang="en-US" sz="2300" kern="1200" dirty="0" smtClean="0"/>
-            <a:t> vector)</a:t>
-          </a:r>
-        </a:p>
-        <a:p>
-          <a:pPr lvl="0" algn="ctr" defTabSz="1022350">
-            <a:lnSpc>
-              <a:spcPct val="90000"/>
-            </a:lnSpc>
-            <a:spcBef>
-              <a:spcPct val="0"/>
-            </a:spcBef>
-            <a:spcAft>
-              <a:spcPct val="35000"/>
-            </a:spcAft>
-          </a:pPr>
-          <a:r>
-            <a:rPr lang="en-US" sz="2300" kern="1200" dirty="0" smtClean="0"/>
-            <a:t>In JSON.</a:t>
-          </a:r>
-          <a:endParaRPr lang="en-US" sz="2300" kern="1200" dirty="0"/>
-        </a:p>
-      </dsp:txBody>
-      <dsp:txXfrm>
-        <a:off x="7792503" y="1395494"/>
-        <a:ext cx="2665308" cy="1560349"/>
-      </dsp:txXfrm>
-    </dsp:sp>
   </dsp:spTree>
 </dsp:drawing>
 </file>
@@ -11416,21 +9950,8 @@
           <a:p>
             <a:r>
               <a:rPr lang="en-US" dirty="0" smtClean="0"/>
-              <a:t>Document frequency vector is calculated </a:t>
-            </a:r>
-            <a:r>
-              <a:rPr lang="en-US" dirty="0" smtClean="0"/>
-              <a:t>in a reducer by </a:t>
-            </a:r>
-            <a:r>
-              <a:rPr lang="en-US" dirty="0" smtClean="0"/>
-              <a:t>counting the number of </a:t>
-            </a:r>
-            <a:r>
-              <a:rPr lang="en-US" dirty="0" smtClean="0"/>
-              <a:t>unique documents that each term appears in.</a:t>
-            </a:r>
-            <a:endParaRPr lang="en-US" dirty="0" smtClean="0"/>
+              <a:t>Document frequency vector is calculated in a reducer by counting the number of unique documents that each term appears in.</a:t>
+            </a:r>
           </a:p>
           <a:p>
             <a:r>
@@ -11485,11 +10006,7 @@
           <a:p>
             <a:r>
               <a:rPr lang="en-US" dirty="0" smtClean="0"/>
-              <a:t>From </a:t>
-            </a:r>
-            <a:r>
-              <a:rPr lang="en-US" dirty="0" smtClean="0"/>
-              <a:t>these data structures we can calculate the inverse document frequency (</a:t>
+              <a:t>From these data structures we can calculate the inverse document frequency (</a:t>
             </a:r>
             <a:r>
               <a:rPr lang="en-US" dirty="0" err="1" smtClean="0"/>
@@ -11666,11 +10183,7 @@
             <a:pPr algn="ctr"/>
             <a:r>
               <a:rPr lang="en-US" sz="2800" dirty="0" smtClean="0"/>
-              <a:t>Hadoop </a:t>
-            </a:r>
-            <a:r>
-              <a:rPr lang="en-US" sz="2800" dirty="0" smtClean="0"/>
-              <a:t>mapper</a:t>
+              <a:t>Hadoop mapper</a:t>
             </a:r>
             <a:endParaRPr lang="en-US" sz="2800" dirty="0"/>
           </a:p>
@@ -11718,11 +10231,7 @@
           <a:p>
             <a:r>
               <a:rPr lang="en-US" dirty="0" smtClean="0"/>
-              <a:t>How is this parallelized in Hadoop</a:t>
-            </a:r>
-            <a:r>
-              <a:rPr lang="en-US" dirty="0" smtClean="0"/>
-              <a:t>?</a:t>
+              <a:t>How is this parallelized in Hadoop?</a:t>
             </a:r>
             <a:endParaRPr lang="en-US" dirty="0"/>
           </a:p>
@@ -11988,7 +10497,6 @@
               <a:rPr lang="en-US" dirty="0"/>
               <a:t> vectors, how do we cluster?</a:t>
             </a:r>
-            <a:endParaRPr lang="en-US" dirty="0"/>
           </a:p>
         </p:txBody>
       </p:sp>
@@ -12274,7 +10782,7 @@
           <a:p>
             <a:r>
               <a:rPr lang="en-US" dirty="0" smtClean="0"/>
-              <a:t>The Mahout K-means algorithm was also considered, but Apache Spark offered an easier set up and a Python API so it was used.</a:t>
+              <a:t>The Mahout K-means algorithm was also considered, but Apache Spark offered an easier set-up and a Python API so it was used.</a:t>
             </a:r>
           </a:p>
           <a:p>
@@ -12628,6 +11136,155 @@
       </p:grpSpPr>
       <p:sp>
         <p:nvSpPr>
+          <p:cNvPr id="2" name="Title 1"/>
+          <p:cNvSpPr>
+            <a:spLocks noGrp="1"/>
+          </p:cNvSpPr>
+          <p:nvPr>
+            <p:ph type="title"/>
+          </p:nvPr>
+        </p:nvSpPr>
+        <p:spPr/>
+        <p:txBody>
+          <a:bodyPr/>
+          <a:lstStyle/>
+          <a:p>
+            <a:r>
+              <a:rPr lang="en-US" dirty="0" smtClean="0"/>
+              <a:t>Analysis on number of clusters</a:t>
+            </a:r>
+            <a:endParaRPr lang="en-US" dirty="0"/>
+          </a:p>
+        </p:txBody>
+      </p:sp>
+      <p:pic>
+        <p:nvPicPr>
+          <p:cNvPr id="5" name="Picture Placeholder 4"/>
+          <p:cNvPicPr>
+            <a:picLocks noGrp="1" noChangeAspect="1"/>
+          </p:cNvPicPr>
+          <p:nvPr>
+            <p:ph type="pic" idx="1"/>
+          </p:nvPr>
+        </p:nvPicPr>
+        <p:blipFill>
+          <a:blip r:embed="rId2">
+            <a:extLst>
+              <a:ext uri="{28A0092B-C50C-407E-A947-70E740481C1C}">
+                <a14:useLocalDpi xmlns:a14="http://schemas.microsoft.com/office/drawing/2010/main" val="0"/>
+              </a:ext>
+            </a:extLst>
+          </a:blip>
+          <a:stretch>
+            <a:fillRect/>
+          </a:stretch>
+        </p:blipFill>
+        <p:spPr>
+          <a:xfrm>
+            <a:off x="5183188" y="1109663"/>
+            <a:ext cx="6172200" cy="4629149"/>
+          </a:xfrm>
+        </p:spPr>
+      </p:pic>
+      <p:sp>
+        <p:nvSpPr>
+          <p:cNvPr id="4" name="Text Placeholder 3"/>
+          <p:cNvSpPr>
+            <a:spLocks noGrp="1"/>
+          </p:cNvSpPr>
+          <p:nvPr>
+            <p:ph type="body" sz="half" idx="2"/>
+          </p:nvPr>
+        </p:nvSpPr>
+        <p:spPr/>
+        <p:txBody>
+          <a:bodyPr/>
+          <a:lstStyle/>
+          <a:p>
+            <a:pPr marL="285750" indent="-285750">
+              <a:buFont typeface="Arial" panose="020B0604020202020204" pitchFamily="34" charset="0"/>
+              <a:buChar char="•"/>
+            </a:pPr>
+            <a:r>
+              <a:rPr lang="en-US" dirty="0" smtClean="0"/>
+              <a:t>Each cluster contains a vector of the 20 highest discriminative terms for that cluster.</a:t>
+            </a:r>
+          </a:p>
+          <a:p>
+            <a:pPr marL="285750" indent="-285750">
+              <a:buFont typeface="Arial" panose="020B0604020202020204" pitchFamily="34" charset="0"/>
+              <a:buChar char="•"/>
+            </a:pPr>
+            <a:r>
+              <a:rPr lang="en-US" dirty="0" smtClean="0"/>
+              <a:t>Notice </a:t>
+            </a:r>
+            <a:r>
+              <a:rPr lang="en-US" dirty="0" smtClean="0"/>
+              <a:t>how the average is </a:t>
+            </a:r>
+            <a:r>
+              <a:rPr lang="en-US" smtClean="0"/>
+              <a:t>maximized </a:t>
+            </a:r>
+            <a:r>
+              <a:rPr lang="en-US" smtClean="0"/>
+              <a:t>at 14 </a:t>
+            </a:r>
+            <a:r>
+              <a:rPr lang="en-US" dirty="0" smtClean="0"/>
+              <a:t>clusters</a:t>
+            </a:r>
+            <a:r>
+              <a:rPr lang="en-US" dirty="0" smtClean="0"/>
+              <a:t>.</a:t>
+            </a:r>
+          </a:p>
+          <a:p>
+            <a:pPr marL="285750" indent="-285750">
+              <a:buFont typeface="Arial" panose="020B0604020202020204" pitchFamily="34" charset="0"/>
+              <a:buChar char="•"/>
+            </a:pPr>
+            <a:r>
+              <a:rPr lang="en-US" dirty="0" smtClean="0"/>
+              <a:t>Due to these results, we will be using the 14 clusters found to have the highest average discriminative terms.</a:t>
+            </a:r>
+            <a:endParaRPr lang="en-US" dirty="0"/>
+          </a:p>
+        </p:txBody>
+      </p:sp>
+    </p:spTree>
+    <p:extLst>
+      <p:ext uri="{BB962C8B-B14F-4D97-AF65-F5344CB8AC3E}">
+        <p14:creationId xmlns:p14="http://schemas.microsoft.com/office/powerpoint/2010/main" val="1776530436"/>
+      </p:ext>
+    </p:extLst>
+  </p:cSld>
+  <p:clrMapOvr>
+    <a:masterClrMapping/>
+  </p:clrMapOvr>
+</p:sld>
+</file>
+
+<file path=ppt/slides/slide18.xml><?xml version="1.0" encoding="utf-8"?>
+<p:sld xmlns:a="http://schemas.openxmlformats.org/drawingml/2006/main" xmlns:r="http://schemas.openxmlformats.org/officeDocument/2006/relationships" xmlns:p="http://schemas.openxmlformats.org/presentationml/2006/main">
+  <p:cSld>
+    <p:spTree>
+      <p:nvGrpSpPr>
+        <p:cNvPr id="1" name=""/>
+        <p:cNvGrpSpPr/>
+        <p:nvPr/>
+      </p:nvGrpSpPr>
+      <p:grpSpPr>
+        <a:xfrm>
+          <a:off x="0" y="0"/>
+          <a:ext cx="0" cy="0"/>
+          <a:chOff x="0" y="0"/>
+          <a:chExt cx="0" cy="0"/>
+        </a:xfrm>
+      </p:grpSpPr>
+      <p:sp>
+        <p:nvSpPr>
           <p:cNvPr id="5" name="Title 4"/>
           <p:cNvSpPr>
             <a:spLocks noGrp="1"/>
@@ -12711,7 +11368,7 @@
 </p:sld>
 </file>
 
-<file path=ppt/slides/slide18.xml><?xml version="1.0" encoding="utf-8"?>
+<file path=ppt/slides/slide19.xml><?xml version="1.0" encoding="utf-8"?>
 <p:sld xmlns:a="http://schemas.openxmlformats.org/drawingml/2006/main" xmlns:r="http://schemas.openxmlformats.org/officeDocument/2006/relationships" xmlns:p="http://schemas.openxmlformats.org/presentationml/2006/main">
   <p:cSld>
     <p:spTree>
@@ -12790,7 +11447,86 @@
 </p:sld>
 </file>
 
-<file path=ppt/slides/slide19.xml><?xml version="1.0" encoding="utf-8"?>
+<file path=ppt/slides/slide2.xml><?xml version="1.0" encoding="utf-8"?>
+<p:sld xmlns:a="http://schemas.openxmlformats.org/drawingml/2006/main" xmlns:r="http://schemas.openxmlformats.org/officeDocument/2006/relationships" xmlns:p="http://schemas.openxmlformats.org/presentationml/2006/main">
+  <p:cSld>
+    <p:spTree>
+      <p:nvGrpSpPr>
+        <p:cNvPr id="1" name=""/>
+        <p:cNvGrpSpPr/>
+        <p:nvPr/>
+      </p:nvGrpSpPr>
+      <p:grpSpPr>
+        <a:xfrm>
+          <a:off x="0" y="0"/>
+          <a:ext cx="0" cy="0"/>
+          <a:chOff x="0" y="0"/>
+          <a:chExt cx="0" cy="0"/>
+        </a:xfrm>
+      </p:grpSpPr>
+      <p:sp>
+        <p:nvSpPr>
+          <p:cNvPr id="2" name="Title 1"/>
+          <p:cNvSpPr>
+            <a:spLocks noGrp="1"/>
+          </p:cNvSpPr>
+          <p:nvPr>
+            <p:ph type="title"/>
+          </p:nvPr>
+        </p:nvSpPr>
+        <p:spPr/>
+        <p:txBody>
+          <a:bodyPr/>
+          <a:lstStyle/>
+          <a:p>
+            <a:r>
+              <a:rPr lang="en-US" dirty="0" smtClean="0"/>
+              <a:t>Part 1: Data Acquisition</a:t>
+            </a:r>
+            <a:endParaRPr lang="en-US" dirty="0"/>
+          </a:p>
+        </p:txBody>
+      </p:sp>
+      <p:sp>
+        <p:nvSpPr>
+          <p:cNvPr id="3" name="Text Placeholder 2"/>
+          <p:cNvSpPr>
+            <a:spLocks noGrp="1"/>
+          </p:cNvSpPr>
+          <p:nvPr>
+            <p:ph type="body" idx="1"/>
+          </p:nvPr>
+        </p:nvSpPr>
+        <p:spPr/>
+        <p:txBody>
+          <a:bodyPr/>
+          <a:lstStyle/>
+          <a:p>
+            <a:endParaRPr lang="en-US"/>
+          </a:p>
+        </p:txBody>
+      </p:sp>
+    </p:spTree>
+    <p:extLst>
+      <p:ext uri="{BB962C8B-B14F-4D97-AF65-F5344CB8AC3E}">
+        <p14:creationId xmlns:p14="http://schemas.microsoft.com/office/powerpoint/2010/main" val="2526114399"/>
+      </p:ext>
+    </p:extLst>
+  </p:cSld>
+  <p:clrMapOvr>
+    <a:masterClrMapping/>
+  </p:clrMapOvr>
+  <p:timing>
+    <p:tnLst>
+      <p:par>
+        <p:cTn id="1" dur="indefinite" restart="never" nodeType="tmRoot"/>
+      </p:par>
+    </p:tnLst>
+  </p:timing>
+</p:sld>
+</file>
+
+<file path=ppt/slides/slide20.xml><?xml version="1.0" encoding="utf-8"?>
 <p:sld xmlns:a="http://schemas.openxmlformats.org/drawingml/2006/main" xmlns:r="http://schemas.openxmlformats.org/officeDocument/2006/relationships" xmlns:p="http://schemas.openxmlformats.org/presentationml/2006/main">
   <p:cSld>
     <p:spTree>
@@ -12937,85 +11673,6 @@
     <p:extLst>
       <p:ext uri="{BB962C8B-B14F-4D97-AF65-F5344CB8AC3E}">
         <p14:creationId xmlns:p14="http://schemas.microsoft.com/office/powerpoint/2010/main" val="3759193945"/>
-      </p:ext>
-    </p:extLst>
-  </p:cSld>
-  <p:clrMapOvr>
-    <a:masterClrMapping/>
-  </p:clrMapOvr>
-  <p:timing>
-    <p:tnLst>
-      <p:par>
-        <p:cTn id="1" dur="indefinite" restart="never" nodeType="tmRoot"/>
-      </p:par>
-    </p:tnLst>
-  </p:timing>
-</p:sld>
-</file>
-
-<file path=ppt/slides/slide2.xml><?xml version="1.0" encoding="utf-8"?>
-<p:sld xmlns:a="http://schemas.openxmlformats.org/drawingml/2006/main" xmlns:r="http://schemas.openxmlformats.org/officeDocument/2006/relationships" xmlns:p="http://schemas.openxmlformats.org/presentationml/2006/main">
-  <p:cSld>
-    <p:spTree>
-      <p:nvGrpSpPr>
-        <p:cNvPr id="1" name=""/>
-        <p:cNvGrpSpPr/>
-        <p:nvPr/>
-      </p:nvGrpSpPr>
-      <p:grpSpPr>
-        <a:xfrm>
-          <a:off x="0" y="0"/>
-          <a:ext cx="0" cy="0"/>
-          <a:chOff x="0" y="0"/>
-          <a:chExt cx="0" cy="0"/>
-        </a:xfrm>
-      </p:grpSpPr>
-      <p:sp>
-        <p:nvSpPr>
-          <p:cNvPr id="2" name="Title 1"/>
-          <p:cNvSpPr>
-            <a:spLocks noGrp="1"/>
-          </p:cNvSpPr>
-          <p:nvPr>
-            <p:ph type="title"/>
-          </p:nvPr>
-        </p:nvSpPr>
-        <p:spPr/>
-        <p:txBody>
-          <a:bodyPr/>
-          <a:lstStyle/>
-          <a:p>
-            <a:r>
-              <a:rPr lang="en-US" dirty="0" smtClean="0"/>
-              <a:t>Part 1: Data Acquisition</a:t>
-            </a:r>
-            <a:endParaRPr lang="en-US" dirty="0"/>
-          </a:p>
-        </p:txBody>
-      </p:sp>
-      <p:sp>
-        <p:nvSpPr>
-          <p:cNvPr id="3" name="Text Placeholder 2"/>
-          <p:cNvSpPr>
-            <a:spLocks noGrp="1"/>
-          </p:cNvSpPr>
-          <p:nvPr>
-            <p:ph type="body" idx="1"/>
-          </p:nvPr>
-        </p:nvSpPr>
-        <p:spPr/>
-        <p:txBody>
-          <a:bodyPr/>
-          <a:lstStyle/>
-          <a:p>
-            <a:endParaRPr lang="en-US"/>
-          </a:p>
-        </p:txBody>
-      </p:sp>
-    </p:spTree>
-    <p:extLst>
-      <p:ext uri="{BB962C8B-B14F-4D97-AF65-F5344CB8AC3E}">
-        <p14:creationId xmlns:p14="http://schemas.microsoft.com/office/powerpoint/2010/main" val="2526114399"/>
       </p:ext>
     </p:extLst>
   </p:cSld>
@@ -13774,11 +12431,7 @@
           <a:p>
             <a:r>
               <a:rPr lang="en-US" sz="3600" dirty="0" smtClean="0"/>
-              <a:t>How is this parallelized in Hadoop</a:t>
-            </a:r>
-            <a:r>
-              <a:rPr lang="en-US" sz="3600" dirty="0" smtClean="0"/>
-              <a:t>? – Term frequency</a:t>
+              <a:t>How is this parallelized in Hadoop? – Term frequency</a:t>
             </a:r>
             <a:endParaRPr lang="en-US" sz="3600" dirty="0"/>
           </a:p>
@@ -13844,8 +12497,8 @@
           </a:p>
         </p:txBody>
       </p:sp>
-      <mc:AlternateContent xmlns:mc="http://schemas.openxmlformats.org/markup-compatibility/2006">
-        <mc:Choice xmlns:a14="http://schemas.microsoft.com/office/drawing/2010/main" Requires="a14">
+      <mc:AlternateContent xmlns:mc="http://schemas.openxmlformats.org/markup-compatibility/2006" xmlns:a14="http://schemas.microsoft.com/office/drawing/2010/main">
+        <mc:Choice Requires="a14">
           <p:sp>
             <p:nvSpPr>
               <p:cNvPr id="5" name="Content Placeholder 4"/>
@@ -13869,34 +12522,13 @@
               <a:p>
                 <a:r>
                   <a:rPr lang="en-US" dirty="0" smtClean="0"/>
-                  <a:t>A pandas Series is </a:t>
+                  <a:t>A pandas Series is constructed for all documents. This is sparse, because it specifies the entries which are non-zero.</a:t>
                 </a:r>
-                <a:r>
-                  <a:rPr lang="en-US" dirty="0" smtClean="0"/>
-                  <a:t>constructed for all documents</a:t>
-                </a:r>
-                <a:r>
-                  <a:rPr lang="en-US" dirty="0" smtClean="0"/>
-                  <a:t>. This is sparse, because it specifies the entries which ar</a:t>
-                </a:r>
-                <a:r>
-                  <a:rPr lang="en-US" dirty="0" smtClean="0"/>
-                  <a:t>e non-zero.</a:t>
-                </a:r>
-                <a:endParaRPr lang="en-US" dirty="0" smtClean="0"/>
               </a:p>
               <a:p>
                 <a:r>
                   <a:rPr lang="en-US" dirty="0" smtClean="0"/>
-                  <a:t>Augmented </a:t>
-                </a:r>
-                <a:r>
-                  <a:rPr lang="en-US" dirty="0" smtClean="0"/>
-                  <a:t>(normalized) </a:t>
-                </a:r>
-                <a:r>
-                  <a:rPr lang="en-US" dirty="0" smtClean="0"/>
-                  <a:t>term frequency vector is calculated. </a:t>
+                  <a:t>Augmented (normalized) term frequency vector is calculated. </a:t>
                 </a:r>
               </a:p>
               <a:p>
@@ -14099,7 +12731,7 @@
             </p:txBody>
           </p:sp>
         </mc:Choice>
-        <mc:Fallback>
+        <mc:Fallback xmlns="">
           <p:sp>
             <p:nvSpPr>
               <p:cNvPr id="5" name="Content Placeholder 4"/>
@@ -14253,11 +12885,7 @@
             </a:r>
             <a:r>
               <a:rPr lang="en-US" sz="4400" dirty="0" smtClean="0"/>
-              <a:t>Hadoop </a:t>
-            </a:r>
-            <a:r>
-              <a:rPr lang="en-US" sz="4400" dirty="0" smtClean="0"/>
-              <a:t>reducer</a:t>
+              <a:t>Hadoop reducer</a:t>
             </a:r>
             <a:endParaRPr lang="en-US" dirty="0"/>
           </a:p>
@@ -14307,11 +12935,7 @@
           <a:p>
             <a:r>
               <a:rPr lang="en-US" sz="3600" dirty="0" smtClean="0"/>
-              <a:t>How is this parallelized in Hadoop</a:t>
-            </a:r>
-            <a:r>
-              <a:rPr lang="en-US" sz="3600" dirty="0" smtClean="0"/>
-              <a:t>? – Doc frequency</a:t>
+              <a:t>How is this parallelized in Hadoop? – Doc frequency</a:t>
             </a:r>
             <a:endParaRPr lang="en-US" sz="3600" dirty="0"/>
           </a:p>

</xml_diff>